<commit_message>
basic descriptive stats + accompanying figs for pcs complete
</commit_message>
<xml_diff>
--- a/summary stats figures.pptx
+++ b/summary stats figures.pptx
@@ -18,6 +18,12 @@
     <p:sldId id="266" r:id="rId12"/>
     <p:sldId id="267" r:id="rId13"/>
     <p:sldId id="268" r:id="rId14"/>
+    <p:sldId id="269" r:id="rId15"/>
+    <p:sldId id="270" r:id="rId16"/>
+    <p:sldId id="271" r:id="rId17"/>
+    <p:sldId id="272" r:id="rId18"/>
+    <p:sldId id="274" r:id="rId19"/>
+    <p:sldId id="273" r:id="rId20"/>
   </p:sldIdLst>
   <p:sldSz cx="12192000" cy="6858000"/>
   <p:notesSz cx="6858000" cy="9144000"/>
@@ -3730,6 +3736,470 @@
     <p:extLst>
       <p:ext uri="{BB962C8B-B14F-4D97-AF65-F5344CB8AC3E}">
         <p14:creationId xmlns:p14="http://schemas.microsoft.com/office/powerpoint/2010/main" val="2100224508"/>
+      </p:ext>
+    </p:extLst>
+  </p:cSld>
+  <p:clrMapOvr>
+    <a:masterClrMapping/>
+  </p:clrMapOvr>
+</p:sld>
+</file>
+
+<file path=ppt/slides/slide14.xml><?xml version="1.0" encoding="utf-8"?>
+<p:sld xmlns:a="http://schemas.openxmlformats.org/drawingml/2006/main" xmlns:r="http://schemas.openxmlformats.org/officeDocument/2006/relationships" xmlns:p="http://schemas.openxmlformats.org/presentationml/2006/main">
+  <p:cSld>
+    <p:spTree>
+      <p:nvGrpSpPr>
+        <p:cNvPr id="1" name=""/>
+        <p:cNvGrpSpPr/>
+        <p:nvPr/>
+      </p:nvGrpSpPr>
+      <p:grpSpPr>
+        <a:xfrm>
+          <a:off x="0" y="0"/>
+          <a:ext cx="0" cy="0"/>
+          <a:chOff x="0" y="0"/>
+          <a:chExt cx="0" cy="0"/>
+        </a:xfrm>
+      </p:grpSpPr>
+      <p:sp>
+        <p:nvSpPr>
+          <p:cNvPr id="2" name="Title 1">
+            <a:extLst>
+              <a:ext uri="{FF2B5EF4-FFF2-40B4-BE49-F238E27FC236}">
+                <a16:creationId xmlns:a16="http://schemas.microsoft.com/office/drawing/2014/main" id="{32B872F8-C246-E098-DDFD-8642289FEE7D}"/>
+              </a:ext>
+            </a:extLst>
+          </p:cNvPr>
+          <p:cNvSpPr>
+            <a:spLocks noGrp="1"/>
+          </p:cNvSpPr>
+          <p:nvPr>
+            <p:ph type="ctrTitle"/>
+          </p:nvPr>
+        </p:nvSpPr>
+        <p:spPr>
+          <a:xfrm>
+            <a:off x="1524000" y="1850332"/>
+            <a:ext cx="9144000" cy="2387600"/>
+          </a:xfrm>
+        </p:spPr>
+        <p:txBody>
+          <a:bodyPr/>
+          <a:lstStyle/>
+          <a:p>
+            <a:r>
+              <a:rPr lang="en-US" dirty="0"/>
+              <a:t>Physical Health (PCS of VR12) by cohort</a:t>
+            </a:r>
+          </a:p>
+        </p:txBody>
+      </p:sp>
+    </p:spTree>
+    <p:extLst>
+      <p:ext uri="{BB962C8B-B14F-4D97-AF65-F5344CB8AC3E}">
+        <p14:creationId xmlns:p14="http://schemas.microsoft.com/office/powerpoint/2010/main" val="2063115049"/>
+      </p:ext>
+    </p:extLst>
+  </p:cSld>
+  <p:clrMapOvr>
+    <a:masterClrMapping/>
+  </p:clrMapOvr>
+</p:sld>
+</file>
+
+<file path=ppt/slides/slide15.xml><?xml version="1.0" encoding="utf-8"?>
+<p:sld xmlns:a="http://schemas.openxmlformats.org/drawingml/2006/main" xmlns:r="http://schemas.openxmlformats.org/officeDocument/2006/relationships" xmlns:p="http://schemas.openxmlformats.org/presentationml/2006/main">
+  <p:cSld>
+    <p:spTree>
+      <p:nvGrpSpPr>
+        <p:cNvPr id="1" name=""/>
+        <p:cNvGrpSpPr/>
+        <p:nvPr/>
+      </p:nvGrpSpPr>
+      <p:grpSpPr>
+        <a:xfrm>
+          <a:off x="0" y="0"/>
+          <a:ext cx="0" cy="0"/>
+          <a:chOff x="0" y="0"/>
+          <a:chExt cx="0" cy="0"/>
+        </a:xfrm>
+      </p:grpSpPr>
+      <p:pic>
+        <p:nvPicPr>
+          <p:cNvPr id="2" name="Picture 1">
+            <a:extLst>
+              <a:ext uri="{FF2B5EF4-FFF2-40B4-BE49-F238E27FC236}">
+                <a16:creationId xmlns:a16="http://schemas.microsoft.com/office/drawing/2014/main" id="{68A1F2AE-BEAB-896F-76E6-9AE77113B4DE}"/>
+              </a:ext>
+            </a:extLst>
+          </p:cNvPr>
+          <p:cNvPicPr>
+            <a:picLocks noChangeAspect="1"/>
+          </p:cNvPicPr>
+          <p:nvPr/>
+        </p:nvPicPr>
+        <p:blipFill>
+          <a:blip r:embed="rId2"/>
+          <a:stretch>
+            <a:fillRect/>
+          </a:stretch>
+        </p:blipFill>
+        <p:spPr>
+          <a:xfrm>
+            <a:off x="266700" y="800100"/>
+            <a:ext cx="5829300" cy="5257800"/>
+          </a:xfrm>
+          <a:prstGeom prst="rect">
+            <a:avLst/>
+          </a:prstGeom>
+          <a:ln>
+            <a:solidFill>
+              <a:schemeClr val="tx1"/>
+            </a:solidFill>
+          </a:ln>
+        </p:spPr>
+      </p:pic>
+      <p:pic>
+        <p:nvPicPr>
+          <p:cNvPr id="3" name="Picture 2">
+            <a:extLst>
+              <a:ext uri="{FF2B5EF4-FFF2-40B4-BE49-F238E27FC236}">
+                <a16:creationId xmlns:a16="http://schemas.microsoft.com/office/drawing/2014/main" id="{A7ABB28E-1814-7909-10B6-C8CDD511A4B1}"/>
+              </a:ext>
+            </a:extLst>
+          </p:cNvPr>
+          <p:cNvPicPr>
+            <a:picLocks noChangeAspect="1"/>
+          </p:cNvPicPr>
+          <p:nvPr/>
+        </p:nvPicPr>
+        <p:blipFill>
+          <a:blip r:embed="rId3"/>
+          <a:stretch>
+            <a:fillRect/>
+          </a:stretch>
+        </p:blipFill>
+        <p:spPr>
+          <a:xfrm>
+            <a:off x="6175899" y="800100"/>
+            <a:ext cx="5829300" cy="5257800"/>
+          </a:xfrm>
+          <a:prstGeom prst="rect">
+            <a:avLst/>
+          </a:prstGeom>
+          <a:ln>
+            <a:solidFill>
+              <a:schemeClr val="tx1"/>
+            </a:solidFill>
+          </a:ln>
+        </p:spPr>
+      </p:pic>
+    </p:spTree>
+    <p:extLst>
+      <p:ext uri="{BB962C8B-B14F-4D97-AF65-F5344CB8AC3E}">
+        <p14:creationId xmlns:p14="http://schemas.microsoft.com/office/powerpoint/2010/main" val="429333147"/>
+      </p:ext>
+    </p:extLst>
+  </p:cSld>
+  <p:clrMapOvr>
+    <a:masterClrMapping/>
+  </p:clrMapOvr>
+</p:sld>
+</file>
+
+<file path=ppt/slides/slide16.xml><?xml version="1.0" encoding="utf-8"?>
+<p:sld xmlns:a="http://schemas.openxmlformats.org/drawingml/2006/main" xmlns:r="http://schemas.openxmlformats.org/officeDocument/2006/relationships" xmlns:p="http://schemas.openxmlformats.org/presentationml/2006/main">
+  <p:cSld>
+    <p:spTree>
+      <p:nvGrpSpPr>
+        <p:cNvPr id="1" name=""/>
+        <p:cNvGrpSpPr/>
+        <p:nvPr/>
+      </p:nvGrpSpPr>
+      <p:grpSpPr>
+        <a:xfrm>
+          <a:off x="0" y="0"/>
+          <a:ext cx="0" cy="0"/>
+          <a:chOff x="0" y="0"/>
+          <a:chExt cx="0" cy="0"/>
+        </a:xfrm>
+      </p:grpSpPr>
+      <p:pic>
+        <p:nvPicPr>
+          <p:cNvPr id="2" name="Picture 1">
+            <a:extLst>
+              <a:ext uri="{FF2B5EF4-FFF2-40B4-BE49-F238E27FC236}">
+                <a16:creationId xmlns:a16="http://schemas.microsoft.com/office/drawing/2014/main" id="{CC806081-05F3-AE31-0C1C-90B979663151}"/>
+              </a:ext>
+            </a:extLst>
+          </p:cNvPr>
+          <p:cNvPicPr>
+            <a:picLocks noChangeAspect="1"/>
+          </p:cNvPicPr>
+          <p:nvPr/>
+        </p:nvPicPr>
+        <p:blipFill>
+          <a:blip r:embed="rId2"/>
+          <a:stretch>
+            <a:fillRect/>
+          </a:stretch>
+        </p:blipFill>
+        <p:spPr>
+          <a:xfrm>
+            <a:off x="237108" y="800100"/>
+            <a:ext cx="5829300" cy="5257800"/>
+          </a:xfrm>
+          <a:prstGeom prst="rect">
+            <a:avLst/>
+          </a:prstGeom>
+          <a:ln>
+            <a:solidFill>
+              <a:schemeClr val="tx1"/>
+            </a:solidFill>
+          </a:ln>
+        </p:spPr>
+      </p:pic>
+      <p:pic>
+        <p:nvPicPr>
+          <p:cNvPr id="3" name="Picture 2">
+            <a:extLst>
+              <a:ext uri="{FF2B5EF4-FFF2-40B4-BE49-F238E27FC236}">
+                <a16:creationId xmlns:a16="http://schemas.microsoft.com/office/drawing/2014/main" id="{1C427369-3596-E1CE-B21E-0CCDB8A8A15F}"/>
+              </a:ext>
+            </a:extLst>
+          </p:cNvPr>
+          <p:cNvPicPr>
+            <a:picLocks noChangeAspect="1"/>
+          </p:cNvPicPr>
+          <p:nvPr/>
+        </p:nvPicPr>
+        <p:blipFill>
+          <a:blip r:embed="rId3"/>
+          <a:stretch>
+            <a:fillRect/>
+          </a:stretch>
+        </p:blipFill>
+        <p:spPr>
+          <a:xfrm>
+            <a:off x="6125594" y="800100"/>
+            <a:ext cx="5829300" cy="5257800"/>
+          </a:xfrm>
+          <a:prstGeom prst="rect">
+            <a:avLst/>
+          </a:prstGeom>
+          <a:ln>
+            <a:solidFill>
+              <a:schemeClr val="tx1"/>
+            </a:solidFill>
+          </a:ln>
+        </p:spPr>
+      </p:pic>
+    </p:spTree>
+    <p:extLst>
+      <p:ext uri="{BB962C8B-B14F-4D97-AF65-F5344CB8AC3E}">
+        <p14:creationId xmlns:p14="http://schemas.microsoft.com/office/powerpoint/2010/main" val="2878598678"/>
+      </p:ext>
+    </p:extLst>
+  </p:cSld>
+  <p:clrMapOvr>
+    <a:masterClrMapping/>
+  </p:clrMapOvr>
+</p:sld>
+</file>
+
+<file path=ppt/slides/slide17.xml><?xml version="1.0" encoding="utf-8"?>
+<p:sld xmlns:a="http://schemas.openxmlformats.org/drawingml/2006/main" xmlns:r="http://schemas.openxmlformats.org/officeDocument/2006/relationships" xmlns:p="http://schemas.openxmlformats.org/presentationml/2006/main">
+  <p:cSld>
+    <p:spTree>
+      <p:nvGrpSpPr>
+        <p:cNvPr id="1" name=""/>
+        <p:cNvGrpSpPr/>
+        <p:nvPr/>
+      </p:nvGrpSpPr>
+      <p:grpSpPr>
+        <a:xfrm>
+          <a:off x="0" y="0"/>
+          <a:ext cx="0" cy="0"/>
+          <a:chOff x="0" y="0"/>
+          <a:chExt cx="0" cy="0"/>
+        </a:xfrm>
+      </p:grpSpPr>
+      <p:pic>
+        <p:nvPicPr>
+          <p:cNvPr id="2" name="Picture 1">
+            <a:extLst>
+              <a:ext uri="{FF2B5EF4-FFF2-40B4-BE49-F238E27FC236}">
+                <a16:creationId xmlns:a16="http://schemas.microsoft.com/office/drawing/2014/main" id="{8014B493-CD66-F8F4-834F-D5310D45459A}"/>
+              </a:ext>
+            </a:extLst>
+          </p:cNvPr>
+          <p:cNvPicPr>
+            <a:picLocks noChangeAspect="1"/>
+          </p:cNvPicPr>
+          <p:nvPr/>
+        </p:nvPicPr>
+        <p:blipFill>
+          <a:blip r:embed="rId2"/>
+          <a:stretch>
+            <a:fillRect/>
+          </a:stretch>
+        </p:blipFill>
+        <p:spPr>
+          <a:xfrm>
+            <a:off x="198453" y="800100"/>
+            <a:ext cx="5829300" cy="5257800"/>
+          </a:xfrm>
+          <a:prstGeom prst="rect">
+            <a:avLst/>
+          </a:prstGeom>
+          <a:ln>
+            <a:solidFill>
+              <a:schemeClr val="tx1"/>
+            </a:solidFill>
+          </a:ln>
+        </p:spPr>
+      </p:pic>
+      <p:pic>
+        <p:nvPicPr>
+          <p:cNvPr id="3" name="Picture 2">
+            <a:extLst>
+              <a:ext uri="{FF2B5EF4-FFF2-40B4-BE49-F238E27FC236}">
+                <a16:creationId xmlns:a16="http://schemas.microsoft.com/office/drawing/2014/main" id="{666BC7E3-7419-341A-0551-2A8096AB8975}"/>
+              </a:ext>
+            </a:extLst>
+          </p:cNvPr>
+          <p:cNvPicPr>
+            <a:picLocks noChangeAspect="1"/>
+          </p:cNvPicPr>
+          <p:nvPr/>
+        </p:nvPicPr>
+        <p:blipFill>
+          <a:blip r:embed="rId3"/>
+          <a:stretch>
+            <a:fillRect/>
+          </a:stretch>
+        </p:blipFill>
+        <p:spPr>
+          <a:xfrm>
+            <a:off x="6164247" y="800100"/>
+            <a:ext cx="5829300" cy="5257800"/>
+          </a:xfrm>
+          <a:prstGeom prst="rect">
+            <a:avLst/>
+          </a:prstGeom>
+          <a:ln>
+            <a:solidFill>
+              <a:schemeClr val="tx1"/>
+            </a:solidFill>
+          </a:ln>
+        </p:spPr>
+      </p:pic>
+    </p:spTree>
+    <p:extLst>
+      <p:ext uri="{BB962C8B-B14F-4D97-AF65-F5344CB8AC3E}">
+        <p14:creationId xmlns:p14="http://schemas.microsoft.com/office/powerpoint/2010/main" val="1142296732"/>
+      </p:ext>
+    </p:extLst>
+  </p:cSld>
+  <p:clrMapOvr>
+    <a:masterClrMapping/>
+  </p:clrMapOvr>
+</p:sld>
+</file>
+
+<file path=ppt/slides/slide18.xml><?xml version="1.0" encoding="utf-8"?>
+<p:sld xmlns:a="http://schemas.openxmlformats.org/drawingml/2006/main" xmlns:r="http://schemas.openxmlformats.org/officeDocument/2006/relationships" xmlns:p="http://schemas.openxmlformats.org/presentationml/2006/main">
+  <p:cSld>
+    <p:spTree>
+      <p:nvGrpSpPr>
+        <p:cNvPr id="1" name=""/>
+        <p:cNvGrpSpPr/>
+        <p:nvPr/>
+      </p:nvGrpSpPr>
+      <p:grpSpPr>
+        <a:xfrm>
+          <a:off x="0" y="0"/>
+          <a:ext cx="0" cy="0"/>
+          <a:chOff x="0" y="0"/>
+          <a:chExt cx="0" cy="0"/>
+        </a:xfrm>
+      </p:grpSpPr>
+      <p:sp>
+        <p:nvSpPr>
+          <p:cNvPr id="2" name="Title 1">
+            <a:extLst>
+              <a:ext uri="{FF2B5EF4-FFF2-40B4-BE49-F238E27FC236}">
+                <a16:creationId xmlns:a16="http://schemas.microsoft.com/office/drawing/2014/main" id="{32B872F8-C246-E098-DDFD-8642289FEE7D}"/>
+              </a:ext>
+            </a:extLst>
+          </p:cNvPr>
+          <p:cNvSpPr>
+            <a:spLocks noGrp="1"/>
+          </p:cNvSpPr>
+          <p:nvPr>
+            <p:ph type="ctrTitle"/>
+          </p:nvPr>
+        </p:nvSpPr>
+        <p:spPr>
+          <a:xfrm>
+            <a:off x="1524000" y="1850332"/>
+            <a:ext cx="9144000" cy="2387600"/>
+          </a:xfrm>
+        </p:spPr>
+        <p:txBody>
+          <a:bodyPr/>
+          <a:lstStyle/>
+          <a:p>
+            <a:r>
+              <a:rPr lang="en-US" dirty="0"/>
+              <a:t>Mental </a:t>
+            </a:r>
+            <a:r>
+              <a:rPr lang="en-US"/>
+              <a:t>Health (MCS </a:t>
+            </a:r>
+            <a:r>
+              <a:rPr lang="en-US" dirty="0"/>
+              <a:t>of VR12) by cohort</a:t>
+            </a:r>
+          </a:p>
+        </p:txBody>
+      </p:sp>
+    </p:spTree>
+    <p:extLst>
+      <p:ext uri="{BB962C8B-B14F-4D97-AF65-F5344CB8AC3E}">
+        <p14:creationId xmlns:p14="http://schemas.microsoft.com/office/powerpoint/2010/main" val="642316517"/>
+      </p:ext>
+    </p:extLst>
+  </p:cSld>
+  <p:clrMapOvr>
+    <a:masterClrMapping/>
+  </p:clrMapOvr>
+</p:sld>
+</file>
+
+<file path=ppt/slides/slide19.xml><?xml version="1.0" encoding="utf-8"?>
+<p:sld xmlns:a="http://schemas.openxmlformats.org/drawingml/2006/main" xmlns:r="http://schemas.openxmlformats.org/officeDocument/2006/relationships" xmlns:p="http://schemas.openxmlformats.org/presentationml/2006/main">
+  <p:cSld>
+    <p:spTree>
+      <p:nvGrpSpPr>
+        <p:cNvPr id="1" name=""/>
+        <p:cNvGrpSpPr/>
+        <p:nvPr/>
+      </p:nvGrpSpPr>
+      <p:grpSpPr>
+        <a:xfrm>
+          <a:off x="0" y="0"/>
+          <a:ext cx="0" cy="0"/>
+          <a:chOff x="0" y="0"/>
+          <a:chExt cx="0" cy="0"/>
+        </a:xfrm>
+      </p:grpSpPr>
+    </p:spTree>
+    <p:extLst>
+      <p:ext uri="{BB962C8B-B14F-4D97-AF65-F5344CB8AC3E}">
+        <p14:creationId xmlns:p14="http://schemas.microsoft.com/office/powerpoint/2010/main" val="433694839"/>
       </p:ext>
     </p:extLst>
   </p:cSld>

</xml_diff>

<commit_message>
mcs descriptives + figs (basic) completed
</commit_message>
<xml_diff>
--- a/summary stats figures.pptx
+++ b/summary stats figures.pptx
@@ -24,6 +24,10 @@
     <p:sldId id="272" r:id="rId18"/>
     <p:sldId id="274" r:id="rId19"/>
     <p:sldId id="273" r:id="rId20"/>
+    <p:sldId id="275" r:id="rId21"/>
+    <p:sldId id="276" r:id="rId22"/>
+    <p:sldId id="278" r:id="rId23"/>
+    <p:sldId id="277" r:id="rId24"/>
   </p:sldIdLst>
   <p:sldSz cx="12192000" cy="6858000"/>
   <p:notesSz cx="6858000" cy="9144000"/>
@@ -4153,15 +4157,7 @@
           <a:p>
             <a:r>
               <a:rPr lang="en-US" dirty="0"/>
-              <a:t>Mental </a:t>
-            </a:r>
-            <a:r>
-              <a:rPr lang="en-US"/>
-              <a:t>Health (MCS </a:t>
-            </a:r>
-            <a:r>
-              <a:rPr lang="en-US" dirty="0"/>
-              <a:t>of VR12) by cohort</a:t>
+              <a:t>Mental Health (MCS of VR12) by cohort</a:t>
             </a:r>
           </a:p>
         </p:txBody>
@@ -4196,6 +4192,76 @@
           <a:chExt cx="0" cy="0"/>
         </a:xfrm>
       </p:grpSpPr>
+      <p:pic>
+        <p:nvPicPr>
+          <p:cNvPr id="2" name="Picture 1">
+            <a:extLst>
+              <a:ext uri="{FF2B5EF4-FFF2-40B4-BE49-F238E27FC236}">
+                <a16:creationId xmlns:a16="http://schemas.microsoft.com/office/drawing/2014/main" id="{B931739C-5C91-EE99-3772-DE6B6AAC3DCF}"/>
+              </a:ext>
+            </a:extLst>
+          </p:cNvPr>
+          <p:cNvPicPr>
+            <a:picLocks noChangeAspect="1"/>
+          </p:cNvPicPr>
+          <p:nvPr/>
+        </p:nvPicPr>
+        <p:blipFill>
+          <a:blip r:embed="rId2"/>
+          <a:stretch>
+            <a:fillRect/>
+          </a:stretch>
+        </p:blipFill>
+        <p:spPr>
+          <a:xfrm>
+            <a:off x="266700" y="800100"/>
+            <a:ext cx="5829300" cy="5257800"/>
+          </a:xfrm>
+          <a:prstGeom prst="rect">
+            <a:avLst/>
+          </a:prstGeom>
+          <a:ln>
+            <a:solidFill>
+              <a:schemeClr val="tx1"/>
+            </a:solidFill>
+          </a:ln>
+        </p:spPr>
+      </p:pic>
+      <p:pic>
+        <p:nvPicPr>
+          <p:cNvPr id="3" name="Picture 2">
+            <a:extLst>
+              <a:ext uri="{FF2B5EF4-FFF2-40B4-BE49-F238E27FC236}">
+                <a16:creationId xmlns:a16="http://schemas.microsoft.com/office/drawing/2014/main" id="{79459436-FAD9-BD49-FEA4-B27F763C5638}"/>
+              </a:ext>
+            </a:extLst>
+          </p:cNvPr>
+          <p:cNvPicPr>
+            <a:picLocks noChangeAspect="1"/>
+          </p:cNvPicPr>
+          <p:nvPr/>
+        </p:nvPicPr>
+        <p:blipFill>
+          <a:blip r:embed="rId3"/>
+          <a:stretch>
+            <a:fillRect/>
+          </a:stretch>
+        </p:blipFill>
+        <p:spPr>
+          <a:xfrm>
+            <a:off x="6190880" y="800100"/>
+            <a:ext cx="5829300" cy="5257800"/>
+          </a:xfrm>
+          <a:prstGeom prst="rect">
+            <a:avLst/>
+          </a:prstGeom>
+          <a:ln>
+            <a:solidFill>
+              <a:schemeClr val="tx1"/>
+            </a:solidFill>
+          </a:ln>
+        </p:spPr>
+      </p:pic>
     </p:spTree>
     <p:extLst>
       <p:ext uri="{BB962C8B-B14F-4D97-AF65-F5344CB8AC3E}">
@@ -4316,6 +4382,307 @@
     <p:extLst>
       <p:ext uri="{BB962C8B-B14F-4D97-AF65-F5344CB8AC3E}">
         <p14:creationId xmlns:p14="http://schemas.microsoft.com/office/powerpoint/2010/main" val="2589478272"/>
+      </p:ext>
+    </p:extLst>
+  </p:cSld>
+  <p:clrMapOvr>
+    <a:masterClrMapping/>
+  </p:clrMapOvr>
+</p:sld>
+</file>
+
+<file path=ppt/slides/slide20.xml><?xml version="1.0" encoding="utf-8"?>
+<p:sld xmlns:a="http://schemas.openxmlformats.org/drawingml/2006/main" xmlns:r="http://schemas.openxmlformats.org/officeDocument/2006/relationships" xmlns:p="http://schemas.openxmlformats.org/presentationml/2006/main">
+  <p:cSld>
+    <p:spTree>
+      <p:nvGrpSpPr>
+        <p:cNvPr id="1" name=""/>
+        <p:cNvGrpSpPr/>
+        <p:nvPr/>
+      </p:nvGrpSpPr>
+      <p:grpSpPr>
+        <a:xfrm>
+          <a:off x="0" y="0"/>
+          <a:ext cx="0" cy="0"/>
+          <a:chOff x="0" y="0"/>
+          <a:chExt cx="0" cy="0"/>
+        </a:xfrm>
+      </p:grpSpPr>
+      <p:pic>
+        <p:nvPicPr>
+          <p:cNvPr id="2" name="Picture 1">
+            <a:extLst>
+              <a:ext uri="{FF2B5EF4-FFF2-40B4-BE49-F238E27FC236}">
+                <a16:creationId xmlns:a16="http://schemas.microsoft.com/office/drawing/2014/main" id="{860A1318-D8F0-BD6B-02FC-5A50CDB71C38}"/>
+              </a:ext>
+            </a:extLst>
+          </p:cNvPr>
+          <p:cNvPicPr>
+            <a:picLocks noChangeAspect="1"/>
+          </p:cNvPicPr>
+          <p:nvPr/>
+        </p:nvPicPr>
+        <p:blipFill>
+          <a:blip r:embed="rId2"/>
+          <a:stretch>
+            <a:fillRect/>
+          </a:stretch>
+        </p:blipFill>
+        <p:spPr>
+          <a:xfrm>
+            <a:off x="266700" y="800100"/>
+            <a:ext cx="5829300" cy="5257800"/>
+          </a:xfrm>
+          <a:prstGeom prst="rect">
+            <a:avLst/>
+          </a:prstGeom>
+          <a:ln>
+            <a:solidFill>
+              <a:schemeClr val="tx1"/>
+            </a:solidFill>
+          </a:ln>
+        </p:spPr>
+      </p:pic>
+      <p:pic>
+        <p:nvPicPr>
+          <p:cNvPr id="3" name="Picture 2">
+            <a:extLst>
+              <a:ext uri="{FF2B5EF4-FFF2-40B4-BE49-F238E27FC236}">
+                <a16:creationId xmlns:a16="http://schemas.microsoft.com/office/drawing/2014/main" id="{F0AED51E-1881-8330-4EA9-8AC7C95904F8}"/>
+              </a:ext>
+            </a:extLst>
+          </p:cNvPr>
+          <p:cNvPicPr>
+            <a:picLocks noChangeAspect="1"/>
+          </p:cNvPicPr>
+          <p:nvPr/>
+        </p:nvPicPr>
+        <p:blipFill>
+          <a:blip r:embed="rId3"/>
+          <a:stretch>
+            <a:fillRect/>
+          </a:stretch>
+        </p:blipFill>
+        <p:spPr>
+          <a:xfrm>
+            <a:off x="6217513" y="800100"/>
+            <a:ext cx="5829300" cy="5257800"/>
+          </a:xfrm>
+          <a:prstGeom prst="rect">
+            <a:avLst/>
+          </a:prstGeom>
+          <a:ln>
+            <a:solidFill>
+              <a:schemeClr val="tx1"/>
+            </a:solidFill>
+          </a:ln>
+        </p:spPr>
+      </p:pic>
+    </p:spTree>
+    <p:extLst>
+      <p:ext uri="{BB962C8B-B14F-4D97-AF65-F5344CB8AC3E}">
+        <p14:creationId xmlns:p14="http://schemas.microsoft.com/office/powerpoint/2010/main" val="538607508"/>
+      </p:ext>
+    </p:extLst>
+  </p:cSld>
+  <p:clrMapOvr>
+    <a:masterClrMapping/>
+  </p:clrMapOvr>
+</p:sld>
+</file>
+
+<file path=ppt/slides/slide21.xml><?xml version="1.0" encoding="utf-8"?>
+<p:sld xmlns:a="http://schemas.openxmlformats.org/drawingml/2006/main" xmlns:r="http://schemas.openxmlformats.org/officeDocument/2006/relationships" xmlns:p="http://schemas.openxmlformats.org/presentationml/2006/main">
+  <p:cSld>
+    <p:spTree>
+      <p:nvGrpSpPr>
+        <p:cNvPr id="1" name=""/>
+        <p:cNvGrpSpPr/>
+        <p:nvPr/>
+      </p:nvGrpSpPr>
+      <p:grpSpPr>
+        <a:xfrm>
+          <a:off x="0" y="0"/>
+          <a:ext cx="0" cy="0"/>
+          <a:chOff x="0" y="0"/>
+          <a:chExt cx="0" cy="0"/>
+        </a:xfrm>
+      </p:grpSpPr>
+      <p:pic>
+        <p:nvPicPr>
+          <p:cNvPr id="2" name="Picture 1">
+            <a:extLst>
+              <a:ext uri="{FF2B5EF4-FFF2-40B4-BE49-F238E27FC236}">
+                <a16:creationId xmlns:a16="http://schemas.microsoft.com/office/drawing/2014/main" id="{D21AE2A7-8976-8B32-AA74-C01804BFB972}"/>
+              </a:ext>
+            </a:extLst>
+          </p:cNvPr>
+          <p:cNvPicPr>
+            <a:picLocks noChangeAspect="1"/>
+          </p:cNvPicPr>
+          <p:nvPr/>
+        </p:nvPicPr>
+        <p:blipFill>
+          <a:blip r:embed="rId2"/>
+          <a:stretch>
+            <a:fillRect/>
+          </a:stretch>
+        </p:blipFill>
+        <p:spPr>
+          <a:xfrm>
+            <a:off x="219352" y="800100"/>
+            <a:ext cx="5829300" cy="5257800"/>
+          </a:xfrm>
+          <a:prstGeom prst="rect">
+            <a:avLst/>
+          </a:prstGeom>
+          <a:ln>
+            <a:solidFill>
+              <a:schemeClr val="tx1"/>
+            </a:solidFill>
+          </a:ln>
+        </p:spPr>
+      </p:pic>
+      <p:pic>
+        <p:nvPicPr>
+          <p:cNvPr id="3" name="Picture 2">
+            <a:extLst>
+              <a:ext uri="{FF2B5EF4-FFF2-40B4-BE49-F238E27FC236}">
+                <a16:creationId xmlns:a16="http://schemas.microsoft.com/office/drawing/2014/main" id="{B95C8271-FC26-3160-EA61-7FE4F3BCFDA1}"/>
+              </a:ext>
+            </a:extLst>
+          </p:cNvPr>
+          <p:cNvPicPr>
+            <a:picLocks noChangeAspect="1"/>
+          </p:cNvPicPr>
+          <p:nvPr/>
+        </p:nvPicPr>
+        <p:blipFill>
+          <a:blip r:embed="rId3"/>
+          <a:stretch>
+            <a:fillRect/>
+          </a:stretch>
+        </p:blipFill>
+        <p:spPr>
+          <a:xfrm>
+            <a:off x="6143350" y="800100"/>
+            <a:ext cx="5829300" cy="5257800"/>
+          </a:xfrm>
+          <a:prstGeom prst="rect">
+            <a:avLst/>
+          </a:prstGeom>
+          <a:ln>
+            <a:solidFill>
+              <a:schemeClr val="tx1"/>
+            </a:solidFill>
+          </a:ln>
+        </p:spPr>
+      </p:pic>
+    </p:spTree>
+    <p:extLst>
+      <p:ext uri="{BB962C8B-B14F-4D97-AF65-F5344CB8AC3E}">
+        <p14:creationId xmlns:p14="http://schemas.microsoft.com/office/powerpoint/2010/main" val="2215693064"/>
+      </p:ext>
+    </p:extLst>
+  </p:cSld>
+  <p:clrMapOvr>
+    <a:masterClrMapping/>
+  </p:clrMapOvr>
+</p:sld>
+</file>
+
+<file path=ppt/slides/slide22.xml><?xml version="1.0" encoding="utf-8"?>
+<p:sld xmlns:a="http://schemas.openxmlformats.org/drawingml/2006/main" xmlns:r="http://schemas.openxmlformats.org/officeDocument/2006/relationships" xmlns:p="http://schemas.openxmlformats.org/presentationml/2006/main">
+  <p:cSld>
+    <p:spTree>
+      <p:nvGrpSpPr>
+        <p:cNvPr id="1" name=""/>
+        <p:cNvGrpSpPr/>
+        <p:nvPr/>
+      </p:nvGrpSpPr>
+      <p:grpSpPr>
+        <a:xfrm>
+          <a:off x="0" y="0"/>
+          <a:ext cx="0" cy="0"/>
+          <a:chOff x="0" y="0"/>
+          <a:chExt cx="0" cy="0"/>
+        </a:xfrm>
+      </p:grpSpPr>
+      <p:sp>
+        <p:nvSpPr>
+          <p:cNvPr id="2" name="Title 1">
+            <a:extLst>
+              <a:ext uri="{FF2B5EF4-FFF2-40B4-BE49-F238E27FC236}">
+                <a16:creationId xmlns:a16="http://schemas.microsoft.com/office/drawing/2014/main" id="{32B872F8-C246-E098-DDFD-8642289FEE7D}"/>
+              </a:ext>
+            </a:extLst>
+          </p:cNvPr>
+          <p:cNvSpPr>
+            <a:spLocks noGrp="1"/>
+          </p:cNvSpPr>
+          <p:nvPr>
+            <p:ph type="ctrTitle"/>
+          </p:nvPr>
+        </p:nvSpPr>
+        <p:spPr>
+          <a:xfrm>
+            <a:off x="1524000" y="1850332"/>
+            <a:ext cx="9144000" cy="2387600"/>
+          </a:xfrm>
+        </p:spPr>
+        <p:txBody>
+          <a:bodyPr/>
+          <a:lstStyle/>
+          <a:p>
+            <a:r>
+              <a:rPr lang="en-US" dirty="0"/>
+              <a:t>ADLs (Activities of </a:t>
+            </a:r>
+            <a:r>
+              <a:rPr lang="en-US"/>
+              <a:t>Daily Living) by </a:t>
+            </a:r>
+            <a:r>
+              <a:rPr lang="en-US" dirty="0"/>
+              <a:t>cohort</a:t>
+            </a:r>
+          </a:p>
+        </p:txBody>
+      </p:sp>
+    </p:spTree>
+    <p:extLst>
+      <p:ext uri="{BB962C8B-B14F-4D97-AF65-F5344CB8AC3E}">
+        <p14:creationId xmlns:p14="http://schemas.microsoft.com/office/powerpoint/2010/main" val="2412126928"/>
+      </p:ext>
+    </p:extLst>
+  </p:cSld>
+  <p:clrMapOvr>
+    <a:masterClrMapping/>
+  </p:clrMapOvr>
+</p:sld>
+</file>
+
+<file path=ppt/slides/slide23.xml><?xml version="1.0" encoding="utf-8"?>
+<p:sld xmlns:a="http://schemas.openxmlformats.org/drawingml/2006/main" xmlns:r="http://schemas.openxmlformats.org/officeDocument/2006/relationships" xmlns:p="http://schemas.openxmlformats.org/presentationml/2006/main">
+  <p:cSld>
+    <p:spTree>
+      <p:nvGrpSpPr>
+        <p:cNvPr id="1" name=""/>
+        <p:cNvGrpSpPr/>
+        <p:nvPr/>
+      </p:nvGrpSpPr>
+      <p:grpSpPr>
+        <a:xfrm>
+          <a:off x="0" y="0"/>
+          <a:ext cx="0" cy="0"/>
+          <a:chOff x="0" y="0"/>
+          <a:chExt cx="0" cy="0"/>
+        </a:xfrm>
+      </p:grpSpPr>
+    </p:spTree>
+    <p:extLst>
+      <p:ext uri="{BB962C8B-B14F-4D97-AF65-F5344CB8AC3E}">
+        <p14:creationId xmlns:p14="http://schemas.microsoft.com/office/powerpoint/2010/main" val="1210852219"/>
       </p:ext>
     </p:extLst>
   </p:cSld>

</xml_diff>

<commit_message>
finalized basic descriptive statistics + figures (only stratified by cohort)
</commit_message>
<xml_diff>
--- a/summary stats figures.pptx
+++ b/summary stats figures.pptx
@@ -28,6 +28,8 @@
     <p:sldId id="276" r:id="rId22"/>
     <p:sldId id="278" r:id="rId23"/>
     <p:sldId id="277" r:id="rId24"/>
+    <p:sldId id="279" r:id="rId25"/>
+    <p:sldId id="280" r:id="rId26"/>
   </p:sldIdLst>
   <p:sldSz cx="12192000" cy="6858000"/>
   <p:notesSz cx="6858000" cy="9144000"/>
@@ -3434,9 +3436,9 @@
           <a:prstGeom prst="rect">
             <a:avLst/>
           </a:prstGeom>
-          <a:ln>
+          <a:ln w="57150">
             <a:solidFill>
-              <a:schemeClr val="tx1"/>
+              <a:srgbClr val="FFFF00"/>
             </a:solidFill>
           </a:ln>
         </p:spPr>
@@ -3629,9 +3631,9 @@
           <a:prstGeom prst="rect">
             <a:avLst/>
           </a:prstGeom>
-          <a:ln>
+          <a:ln w="57150">
             <a:solidFill>
-              <a:schemeClr val="tx1"/>
+              <a:srgbClr val="FF0000"/>
             </a:solidFill>
           </a:ln>
         </p:spPr>
@@ -3729,9 +3731,9 @@
           <a:prstGeom prst="rect">
             <a:avLst/>
           </a:prstGeom>
-          <a:ln>
+          <a:ln w="57150">
             <a:solidFill>
-              <a:schemeClr val="tx1"/>
+              <a:srgbClr val="FF0000"/>
             </a:solidFill>
           </a:ln>
         </p:spPr>
@@ -3857,9 +3859,9 @@
           <a:prstGeom prst="rect">
             <a:avLst/>
           </a:prstGeom>
-          <a:ln>
+          <a:ln w="57150">
             <a:solidFill>
-              <a:schemeClr val="tx1"/>
+              <a:srgbClr val="FFFF00"/>
             </a:solidFill>
           </a:ln>
         </p:spPr>
@@ -3992,9 +3994,9 @@
           <a:prstGeom prst="rect">
             <a:avLst/>
           </a:prstGeom>
-          <a:ln>
+          <a:ln w="57150">
             <a:solidFill>
-              <a:schemeClr val="tx1"/>
+              <a:srgbClr val="FF0000"/>
             </a:solidFill>
           </a:ln>
         </p:spPr>
@@ -4057,9 +4059,9 @@
           <a:prstGeom prst="rect">
             <a:avLst/>
           </a:prstGeom>
-          <a:ln>
+          <a:ln w="57150">
             <a:solidFill>
-              <a:schemeClr val="tx1"/>
+              <a:srgbClr val="FF0000"/>
             </a:solidFill>
           </a:ln>
         </p:spPr>
@@ -4092,9 +4094,9 @@
           <a:prstGeom prst="rect">
             <a:avLst/>
           </a:prstGeom>
-          <a:ln>
+          <a:ln w="57150">
             <a:solidFill>
-              <a:schemeClr val="tx1"/>
+              <a:srgbClr val="FF0000"/>
             </a:solidFill>
           </a:ln>
         </p:spPr>
@@ -4220,9 +4222,9 @@
           <a:prstGeom prst="rect">
             <a:avLst/>
           </a:prstGeom>
-          <a:ln>
+          <a:ln w="57150">
             <a:solidFill>
-              <a:schemeClr val="tx1"/>
+              <a:srgbClr val="FFFF00"/>
             </a:solidFill>
           </a:ln>
         </p:spPr>
@@ -4255,9 +4257,9 @@
           <a:prstGeom prst="rect">
             <a:avLst/>
           </a:prstGeom>
-          <a:ln>
+          <a:ln w="57150">
             <a:solidFill>
-              <a:schemeClr val="tx1"/>
+              <a:srgbClr val="FFFF00"/>
             </a:solidFill>
           </a:ln>
         </p:spPr>
@@ -4371,9 +4373,9 @@
             <a:avLst/>
           </a:prstGeom>
           <a:noFill/>
-          <a:ln>
+          <a:ln w="57150">
             <a:solidFill>
-              <a:schemeClr val="accent1"/>
+              <a:srgbClr val="FF0000"/>
             </a:solidFill>
           </a:ln>
         </p:spPr>
@@ -4436,9 +4438,9 @@
           <a:prstGeom prst="rect">
             <a:avLst/>
           </a:prstGeom>
-          <a:ln>
+          <a:ln w="57150">
             <a:solidFill>
-              <a:schemeClr val="tx1"/>
+              <a:srgbClr val="FFFF00"/>
             </a:solidFill>
           </a:ln>
         </p:spPr>
@@ -4471,9 +4473,9 @@
           <a:prstGeom prst="rect">
             <a:avLst/>
           </a:prstGeom>
-          <a:ln>
+          <a:ln w="57150">
             <a:solidFill>
-              <a:schemeClr val="tx1"/>
+              <a:srgbClr val="FF0000"/>
             </a:solidFill>
           </a:ln>
         </p:spPr>
@@ -4536,9 +4538,9 @@
           <a:prstGeom prst="rect">
             <a:avLst/>
           </a:prstGeom>
-          <a:ln>
+          <a:ln w="57150">
             <a:solidFill>
-              <a:schemeClr val="tx1"/>
+              <a:srgbClr val="FF0000"/>
             </a:solidFill>
           </a:ln>
         </p:spPr>
@@ -4571,9 +4573,9 @@
           <a:prstGeom prst="rect">
             <a:avLst/>
           </a:prstGeom>
-          <a:ln>
+          <a:ln w="57150">
             <a:solidFill>
-              <a:schemeClr val="tx1"/>
+              <a:srgbClr val="FF0000"/>
             </a:solidFill>
           </a:ln>
         </p:spPr>
@@ -4636,15 +4638,7 @@
           <a:p>
             <a:r>
               <a:rPr lang="en-US" dirty="0"/>
-              <a:t>ADLs (Activities of </a:t>
-            </a:r>
-            <a:r>
-              <a:rPr lang="en-US"/>
-              <a:t>Daily Living) by </a:t>
-            </a:r>
-            <a:r>
-              <a:rPr lang="en-US" dirty="0"/>
-              <a:t>cohort</a:t>
+              <a:t>ADLs (Activities of Daily Living) by cohort</a:t>
             </a:r>
           </a:p>
         </p:txBody>
@@ -4679,10 +4673,280 @@
           <a:chExt cx="0" cy="0"/>
         </a:xfrm>
       </p:grpSpPr>
+      <p:pic>
+        <p:nvPicPr>
+          <p:cNvPr id="2" name="Picture 1">
+            <a:extLst>
+              <a:ext uri="{FF2B5EF4-FFF2-40B4-BE49-F238E27FC236}">
+                <a16:creationId xmlns:a16="http://schemas.microsoft.com/office/drawing/2014/main" id="{E651A101-8555-1B47-C2A3-0FB11E9E25C5}"/>
+              </a:ext>
+            </a:extLst>
+          </p:cNvPr>
+          <p:cNvPicPr>
+            <a:picLocks noChangeAspect="1"/>
+          </p:cNvPicPr>
+          <p:nvPr/>
+        </p:nvPicPr>
+        <p:blipFill>
+          <a:blip r:embed="rId2"/>
+          <a:stretch>
+            <a:fillRect/>
+          </a:stretch>
+        </p:blipFill>
+        <p:spPr>
+          <a:xfrm>
+            <a:off x="266700" y="800100"/>
+            <a:ext cx="5829300" cy="5257800"/>
+          </a:xfrm>
+          <a:prstGeom prst="rect">
+            <a:avLst/>
+          </a:prstGeom>
+          <a:ln w="57150">
+            <a:solidFill>
+              <a:srgbClr val="FFFF00"/>
+            </a:solidFill>
+          </a:ln>
+        </p:spPr>
+      </p:pic>
+      <p:pic>
+        <p:nvPicPr>
+          <p:cNvPr id="3" name="Picture 2">
+            <a:extLst>
+              <a:ext uri="{FF2B5EF4-FFF2-40B4-BE49-F238E27FC236}">
+                <a16:creationId xmlns:a16="http://schemas.microsoft.com/office/drawing/2014/main" id="{2D3DEC14-8844-3F47-1E31-3F9AB259A55C}"/>
+              </a:ext>
+            </a:extLst>
+          </p:cNvPr>
+          <p:cNvPicPr>
+            <a:picLocks noChangeAspect="1"/>
+          </p:cNvPicPr>
+          <p:nvPr/>
+        </p:nvPicPr>
+        <p:blipFill>
+          <a:blip r:embed="rId3"/>
+          <a:stretch>
+            <a:fillRect/>
+          </a:stretch>
+        </p:blipFill>
+        <p:spPr>
+          <a:xfrm>
+            <a:off x="6190880" y="800100"/>
+            <a:ext cx="5829300" cy="5257800"/>
+          </a:xfrm>
+          <a:prstGeom prst="rect">
+            <a:avLst/>
+          </a:prstGeom>
+          <a:ln>
+            <a:solidFill>
+              <a:schemeClr val="tx1"/>
+            </a:solidFill>
+          </a:ln>
+        </p:spPr>
+      </p:pic>
     </p:spTree>
     <p:extLst>
       <p:ext uri="{BB962C8B-B14F-4D97-AF65-F5344CB8AC3E}">
         <p14:creationId xmlns:p14="http://schemas.microsoft.com/office/powerpoint/2010/main" val="1210852219"/>
+      </p:ext>
+    </p:extLst>
+  </p:cSld>
+  <p:clrMapOvr>
+    <a:masterClrMapping/>
+  </p:clrMapOvr>
+</p:sld>
+</file>
+
+<file path=ppt/slides/slide24.xml><?xml version="1.0" encoding="utf-8"?>
+<p:sld xmlns:a="http://schemas.openxmlformats.org/drawingml/2006/main" xmlns:r="http://schemas.openxmlformats.org/officeDocument/2006/relationships" xmlns:p="http://schemas.openxmlformats.org/presentationml/2006/main">
+  <p:cSld>
+    <p:spTree>
+      <p:nvGrpSpPr>
+        <p:cNvPr id="1" name=""/>
+        <p:cNvGrpSpPr/>
+        <p:nvPr/>
+      </p:nvGrpSpPr>
+      <p:grpSpPr>
+        <a:xfrm>
+          <a:off x="0" y="0"/>
+          <a:ext cx="0" cy="0"/>
+          <a:chOff x="0" y="0"/>
+          <a:chExt cx="0" cy="0"/>
+        </a:xfrm>
+      </p:grpSpPr>
+      <p:pic>
+        <p:nvPicPr>
+          <p:cNvPr id="2" name="Picture 1">
+            <a:extLst>
+              <a:ext uri="{FF2B5EF4-FFF2-40B4-BE49-F238E27FC236}">
+                <a16:creationId xmlns:a16="http://schemas.microsoft.com/office/drawing/2014/main" id="{2F936E8D-991C-9444-7FCE-0454DF5DBA4C}"/>
+              </a:ext>
+            </a:extLst>
+          </p:cNvPr>
+          <p:cNvPicPr>
+            <a:picLocks noChangeAspect="1"/>
+          </p:cNvPicPr>
+          <p:nvPr/>
+        </p:nvPicPr>
+        <p:blipFill>
+          <a:blip r:embed="rId2"/>
+          <a:stretch>
+            <a:fillRect/>
+          </a:stretch>
+        </p:blipFill>
+        <p:spPr>
+          <a:xfrm>
+            <a:off x="266700" y="800100"/>
+            <a:ext cx="5829300" cy="5257800"/>
+          </a:xfrm>
+          <a:prstGeom prst="rect">
+            <a:avLst/>
+          </a:prstGeom>
+          <a:ln>
+            <a:solidFill>
+              <a:schemeClr val="tx1"/>
+            </a:solidFill>
+          </a:ln>
+        </p:spPr>
+      </p:pic>
+      <p:pic>
+        <p:nvPicPr>
+          <p:cNvPr id="3" name="Picture 2">
+            <a:extLst>
+              <a:ext uri="{FF2B5EF4-FFF2-40B4-BE49-F238E27FC236}">
+                <a16:creationId xmlns:a16="http://schemas.microsoft.com/office/drawing/2014/main" id="{78B83C67-0A5E-CF4C-7F5D-000B45698B86}"/>
+              </a:ext>
+            </a:extLst>
+          </p:cNvPr>
+          <p:cNvPicPr>
+            <a:picLocks noChangeAspect="1"/>
+          </p:cNvPicPr>
+          <p:nvPr/>
+        </p:nvPicPr>
+        <p:blipFill>
+          <a:blip r:embed="rId3"/>
+          <a:stretch>
+            <a:fillRect/>
+          </a:stretch>
+        </p:blipFill>
+        <p:spPr>
+          <a:xfrm>
+            <a:off x="6208635" y="800100"/>
+            <a:ext cx="5829300" cy="5257800"/>
+          </a:xfrm>
+          <a:prstGeom prst="rect">
+            <a:avLst/>
+          </a:prstGeom>
+          <a:ln w="57150">
+            <a:solidFill>
+              <a:srgbClr val="FFFF00"/>
+            </a:solidFill>
+          </a:ln>
+        </p:spPr>
+      </p:pic>
+    </p:spTree>
+    <p:extLst>
+      <p:ext uri="{BB962C8B-B14F-4D97-AF65-F5344CB8AC3E}">
+        <p14:creationId xmlns:p14="http://schemas.microsoft.com/office/powerpoint/2010/main" val="3728156107"/>
+      </p:ext>
+    </p:extLst>
+  </p:cSld>
+  <p:clrMapOvr>
+    <a:masterClrMapping/>
+  </p:clrMapOvr>
+</p:sld>
+</file>
+
+<file path=ppt/slides/slide25.xml><?xml version="1.0" encoding="utf-8"?>
+<p:sld xmlns:a="http://schemas.openxmlformats.org/drawingml/2006/main" xmlns:r="http://schemas.openxmlformats.org/officeDocument/2006/relationships" xmlns:p="http://schemas.openxmlformats.org/presentationml/2006/main">
+  <p:cSld>
+    <p:spTree>
+      <p:nvGrpSpPr>
+        <p:cNvPr id="1" name=""/>
+        <p:cNvGrpSpPr/>
+        <p:nvPr/>
+      </p:nvGrpSpPr>
+      <p:grpSpPr>
+        <a:xfrm>
+          <a:off x="0" y="0"/>
+          <a:ext cx="0" cy="0"/>
+          <a:chOff x="0" y="0"/>
+          <a:chExt cx="0" cy="0"/>
+        </a:xfrm>
+      </p:grpSpPr>
+      <p:pic>
+        <p:nvPicPr>
+          <p:cNvPr id="2" name="Picture 1">
+            <a:extLst>
+              <a:ext uri="{FF2B5EF4-FFF2-40B4-BE49-F238E27FC236}">
+                <a16:creationId xmlns:a16="http://schemas.microsoft.com/office/drawing/2014/main" id="{C5041E27-5AFF-C396-5D8D-1CF876775C79}"/>
+              </a:ext>
+            </a:extLst>
+          </p:cNvPr>
+          <p:cNvPicPr>
+            <a:picLocks noChangeAspect="1"/>
+          </p:cNvPicPr>
+          <p:nvPr/>
+        </p:nvPicPr>
+        <p:blipFill>
+          <a:blip r:embed="rId2"/>
+          <a:stretch>
+            <a:fillRect/>
+          </a:stretch>
+        </p:blipFill>
+        <p:spPr>
+          <a:xfrm>
+            <a:off x="180698" y="800100"/>
+            <a:ext cx="5829300" cy="5257800"/>
+          </a:xfrm>
+          <a:prstGeom prst="rect">
+            <a:avLst/>
+          </a:prstGeom>
+          <a:ln>
+            <a:solidFill>
+              <a:schemeClr val="tx1"/>
+            </a:solidFill>
+          </a:ln>
+        </p:spPr>
+      </p:pic>
+      <p:pic>
+        <p:nvPicPr>
+          <p:cNvPr id="3" name="Picture 2">
+            <a:extLst>
+              <a:ext uri="{FF2B5EF4-FFF2-40B4-BE49-F238E27FC236}">
+                <a16:creationId xmlns:a16="http://schemas.microsoft.com/office/drawing/2014/main" id="{A357E01F-6A9C-7578-4C0C-4ED651D34259}"/>
+              </a:ext>
+            </a:extLst>
+          </p:cNvPr>
+          <p:cNvPicPr>
+            <a:picLocks noChangeAspect="1"/>
+          </p:cNvPicPr>
+          <p:nvPr/>
+        </p:nvPicPr>
+        <p:blipFill>
+          <a:blip r:embed="rId3"/>
+          <a:stretch>
+            <a:fillRect/>
+          </a:stretch>
+        </p:blipFill>
+        <p:spPr>
+          <a:xfrm>
+            <a:off x="6182002" y="800100"/>
+            <a:ext cx="5829300" cy="5257800"/>
+          </a:xfrm>
+          <a:prstGeom prst="rect">
+            <a:avLst/>
+          </a:prstGeom>
+          <a:ln>
+            <a:solidFill>
+              <a:schemeClr val="tx1"/>
+            </a:solidFill>
+          </a:ln>
+        </p:spPr>
+      </p:pic>
+    </p:spTree>
+    <p:extLst>
+      <p:ext uri="{BB962C8B-B14F-4D97-AF65-F5344CB8AC3E}">
+        <p14:creationId xmlns:p14="http://schemas.microsoft.com/office/powerpoint/2010/main" val="2605744887"/>
       </p:ext>
     </p:extLst>
   </p:cSld>
@@ -4745,9 +5009,9 @@
             <a:avLst/>
           </a:prstGeom>
           <a:noFill/>
-          <a:ln>
+          <a:ln w="57150">
             <a:solidFill>
-              <a:schemeClr val="accent1"/>
+              <a:srgbClr val="FF0000"/>
             </a:solidFill>
           </a:ln>
         </p:spPr>
@@ -4788,9 +5052,9 @@
             <a:avLst/>
           </a:prstGeom>
           <a:noFill/>
-          <a:ln>
+          <a:ln w="57150">
             <a:solidFill>
-              <a:schemeClr val="accent1"/>
+              <a:srgbClr val="FF0000"/>
             </a:solidFill>
           </a:ln>
         </p:spPr>
@@ -4861,9 +5125,9 @@
             <a:avLst/>
           </a:prstGeom>
           <a:noFill/>
-          <a:ln>
+          <a:ln w="57150">
             <a:solidFill>
-              <a:schemeClr val="accent1"/>
+              <a:srgbClr val="FF0000"/>
             </a:solidFill>
           </a:ln>
         </p:spPr>
@@ -4934,9 +5198,9 @@
             <a:avLst/>
           </a:prstGeom>
           <a:noFill/>
-          <a:ln>
+          <a:ln w="57150">
             <a:solidFill>
-              <a:schemeClr val="accent1"/>
+              <a:srgbClr val="FF0000"/>
             </a:solidFill>
           </a:ln>
         </p:spPr>
@@ -4969,9 +5233,9 @@
           <a:prstGeom prst="rect">
             <a:avLst/>
           </a:prstGeom>
-          <a:ln>
+          <a:ln w="57150">
             <a:solidFill>
-              <a:schemeClr val="tx1"/>
+              <a:srgbClr val="FF0000"/>
             </a:solidFill>
           </a:ln>
         </p:spPr>
@@ -5097,9 +5361,9 @@
           <a:prstGeom prst="rect">
             <a:avLst/>
           </a:prstGeom>
-          <a:ln>
+          <a:ln w="57150">
             <a:solidFill>
-              <a:schemeClr val="tx1"/>
+              <a:srgbClr val="FF0000"/>
             </a:solidFill>
           </a:ln>
         </p:spPr>
@@ -5232,9 +5496,9 @@
           <a:prstGeom prst="rect">
             <a:avLst/>
           </a:prstGeom>
-          <a:ln>
+          <a:ln w="57150">
             <a:solidFill>
-              <a:schemeClr val="tx1"/>
+              <a:srgbClr val="FFFF00"/>
             </a:solidFill>
           </a:ln>
         </p:spPr>
@@ -5332,9 +5596,9 @@
           <a:prstGeom prst="rect">
             <a:avLst/>
           </a:prstGeom>
-          <a:ln>
+          <a:ln w="57150">
             <a:solidFill>
-              <a:schemeClr val="tx1"/>
+              <a:srgbClr val="FFFF00"/>
             </a:solidFill>
           </a:ln>
         </p:spPr>

</xml_diff>